<commit_message>
Added a bit of text, diagrams
</commit_message>
<xml_diff>
--- a/dqm-EPS17/dag1.pptx
+++ b/dqm-EPS17/dag1.pptx
@@ -2664,7 +2664,7 @@
           <a:p>
             <a:pPr algn="ctr" fontAlgn="base"/>
             <a:r>
-              <a:rPr lang="en-US" sz="800" strike="noStrike" noProof="1">
+              <a:rPr lang="en-US" sz="700" strike="noStrike" noProof="1">
                 <a:solidFill>
                   <a:srgbClr val="FF0000"/>
                 </a:solidFill>
@@ -2672,7 +2672,7 @@
               </a:rPr>
               <a:t>ADC/FFT</a:t>
             </a:r>
-            <a:endParaRPr lang="en-US" sz="800" strike="noStrike" noProof="1">
+            <a:endParaRPr lang="en-US" sz="700" strike="noStrike" noProof="1">
               <a:solidFill>
                 <a:srgbClr val="FF0000"/>
               </a:solidFill>
@@ -3012,7 +3012,7 @@
           <a:p>
             <a:pPr algn="ctr" fontAlgn="base"/>
             <a:r>
-              <a:rPr lang="en-US" sz="935" strike="noStrike" noProof="1">
+              <a:rPr lang="en-US" sz="735" strike="noStrike" noProof="1">
                 <a:solidFill>
                   <a:srgbClr val="00B050"/>
                 </a:solidFill>
@@ -3020,7 +3020,7 @@
               </a:rPr>
               <a:t>SIG</a:t>
             </a:r>
-            <a:endParaRPr lang="en-US" sz="935" strike="noStrike" noProof="1">
+            <a:endParaRPr lang="en-US" sz="735" strike="noStrike" noProof="1">
               <a:solidFill>
                 <a:srgbClr val="00B050"/>
               </a:solidFill>

</xml_diff>